<commit_message>
Updated DOE part 1
</commit_message>
<xml_diff>
--- a/Fall_2021/lecture_7 - Basics of Experimental Design/Lecture_7 - Design_of_experiments-Overview.pptx
+++ b/Fall_2021/lecture_7 - Basics of Experimental Design/Lecture_7 - Design_of_experiments-Overview.pptx
@@ -31050,8 +31050,8 @@
           </a:p>
         </p:txBody>
       </p:sp>
-      <mc:AlternateContent xmlns:mc="http://schemas.openxmlformats.org/markup-compatibility/2006" xmlns:a14="http://schemas.microsoft.com/office/drawing/2010/main">
-        <mc:Choice Requires="a14">
+      <mc:AlternateContent xmlns:mc="http://schemas.openxmlformats.org/markup-compatibility/2006">
+        <mc:Choice xmlns:a14="http://schemas.microsoft.com/office/drawing/2010/main" Requires="a14">
           <p:sp>
             <p:nvSpPr>
               <p:cNvPr id="4" name="Content Placeholder 3">
@@ -31284,18 +31284,6 @@
                           </a:rPr>
                           <m:t>𝑦</m:t>
                         </m:r>
-                        <m:r>
-                          <a:rPr lang="en-US" b="0" i="1" smtClean="0">
-                            <a:latin typeface="Cambria Math" panose="02040503050406030204" pitchFamily="18" charset="0"/>
-                          </a:rPr>
-                          <m:t>, </m:t>
-                        </m:r>
-                        <m:r>
-                          <a:rPr lang="en-US" b="0" i="1" smtClean="0">
-                            <a:latin typeface="Cambria Math" panose="02040503050406030204" pitchFamily="18" charset="0"/>
-                          </a:rPr>
-                          <m:t>𝑦</m:t>
-                        </m:r>
                       </m:e>
                       <m:sub>
                         <m:r>
@@ -31447,82 +31435,6 @@
                 <a:r>
                   <a:rPr lang="en-US" dirty="0"/>
                   <a:t>Two way design (2WD): </a:t>
-                </a:r>
-                <a14:m>
-                  <m:oMath xmlns:m="http://schemas.openxmlformats.org/officeDocument/2006/math">
-                    <m:sSub>
-                      <m:sSubPr>
-                        <m:ctrlPr>
-                          <a:rPr lang="en-US" i="1">
-                            <a:latin typeface="Cambria Math" panose="02040503050406030204" pitchFamily="18" charset="0"/>
-                          </a:rPr>
-                        </m:ctrlPr>
-                      </m:sSubPr>
-                      <m:e>
-                        <m:r>
-                          <a:rPr lang="en-US" b="0" i="1" smtClean="0">
-                            <a:latin typeface="Cambria Math" panose="02040503050406030204" pitchFamily="18" charset="0"/>
-                          </a:rPr>
-                          <m:t>𝑦</m:t>
-                        </m:r>
-                        <m:r>
-                          <a:rPr lang="en-US" b="0" i="1" smtClean="0">
-                            <a:latin typeface="Cambria Math" panose="02040503050406030204" pitchFamily="18" charset="0"/>
-                          </a:rPr>
-                          <m:t>, </m:t>
-                        </m:r>
-                        <m:r>
-                          <a:rPr lang="en-US" i="1">
-                            <a:latin typeface="Cambria Math" panose="02040503050406030204" pitchFamily="18" charset="0"/>
-                          </a:rPr>
-                          <m:t>𝑦</m:t>
-                        </m:r>
-                      </m:e>
-                      <m:sub>
-                        <m:r>
-                          <a:rPr lang="en-US" i="1">
-                            <a:latin typeface="Cambria Math" panose="02040503050406030204" pitchFamily="18" charset="0"/>
-                          </a:rPr>
-                          <m:t>𝑖</m:t>
-                        </m:r>
-                        <m:r>
-                          <a:rPr lang="en-US" i="1">
-                            <a:latin typeface="Cambria Math" panose="02040503050406030204" pitchFamily="18" charset="0"/>
-                          </a:rPr>
-                          <m:t>,</m:t>
-                        </m:r>
-                        <m:sSub>
-                          <m:sSubPr>
-                            <m:ctrlPr>
-                              <a:rPr lang="en-US" i="1">
-                                <a:latin typeface="Cambria Math" panose="02040503050406030204" pitchFamily="18" charset="0"/>
-                              </a:rPr>
-                            </m:ctrlPr>
-                          </m:sSubPr>
-                          <m:e>
-                            <m:r>
-                              <a:rPr lang="en-US" i="1">
-                                <a:latin typeface="Cambria Math" panose="02040503050406030204" pitchFamily="18" charset="0"/>
-                              </a:rPr>
-                              <m:t>𝑘</m:t>
-                            </m:r>
-                          </m:e>
-                          <m:sub>
-                            <m:r>
-                              <a:rPr lang="en-US" i="1">
-                                <a:latin typeface="Cambria Math" panose="02040503050406030204" pitchFamily="18" charset="0"/>
-                              </a:rPr>
-                              <m:t>𝑖</m:t>
-                            </m:r>
-                          </m:sub>
-                        </m:sSub>
-                      </m:sub>
-                    </m:sSub>
-                  </m:oMath>
-                </a14:m>
-                <a:r>
-                  <a:rPr lang="en-US" dirty="0"/>
-                  <a:t>, </a:t>
                 </a:r>
                 <a14:m>
                   <m:oMath xmlns:m="http://schemas.openxmlformats.org/officeDocument/2006/math">
@@ -31779,194 +31691,6 @@
                       </m:sSubPr>
                       <m:e>
                         <m:r>
-                          <a:rPr lang="en-US" b="0" i="1" smtClean="0">
-                            <a:latin typeface="Cambria Math" panose="02040503050406030204" pitchFamily="18" charset="0"/>
-                          </a:rPr>
-                          <m:t>𝑦</m:t>
-                        </m:r>
-                        <m:r>
-                          <a:rPr lang="en-US" b="0" i="1" smtClean="0">
-                            <a:latin typeface="Cambria Math" panose="02040503050406030204" pitchFamily="18" charset="0"/>
-                          </a:rPr>
-                          <m:t>, </m:t>
-                        </m:r>
-                        <m:r>
-                          <a:rPr lang="en-US" i="1">
-                            <a:latin typeface="Cambria Math" panose="02040503050406030204" pitchFamily="18" charset="0"/>
-                          </a:rPr>
-                          <m:t>𝑦</m:t>
-                        </m:r>
-                      </m:e>
-                      <m:sub>
-                        <m:r>
-                          <a:rPr lang="en-US" i="1">
-                            <a:latin typeface="Cambria Math" panose="02040503050406030204" pitchFamily="18" charset="0"/>
-                          </a:rPr>
-                          <m:t>𝑖</m:t>
-                        </m:r>
-                        <m:r>
-                          <a:rPr lang="en-US" i="1">
-                            <a:latin typeface="Cambria Math" panose="02040503050406030204" pitchFamily="18" charset="0"/>
-                          </a:rPr>
-                          <m:t>,</m:t>
-                        </m:r>
-                        <m:sSub>
-                          <m:sSubPr>
-                            <m:ctrlPr>
-                              <a:rPr lang="en-US" i="1">
-                                <a:latin typeface="Cambria Math" panose="02040503050406030204" pitchFamily="18" charset="0"/>
-                              </a:rPr>
-                            </m:ctrlPr>
-                          </m:sSubPr>
-                          <m:e>
-                            <m:r>
-                              <a:rPr lang="en-US" i="1">
-                                <a:latin typeface="Cambria Math" panose="02040503050406030204" pitchFamily="18" charset="0"/>
-                              </a:rPr>
-                              <m:t>𝑘</m:t>
-                            </m:r>
-                          </m:e>
-                          <m:sub>
-                            <m:r>
-                              <a:rPr lang="en-US" i="1">
-                                <a:latin typeface="Cambria Math" panose="02040503050406030204" pitchFamily="18" charset="0"/>
-                              </a:rPr>
-                              <m:t>𝑖</m:t>
-                            </m:r>
-                          </m:sub>
-                        </m:sSub>
-                      </m:sub>
-                    </m:sSub>
-                  </m:oMath>
-                </a14:m>
-                <a:r>
-                  <a:rPr lang="en-US" dirty="0"/>
-                  <a:t>, </a:t>
-                </a:r>
-                <a14:m>
-                  <m:oMath xmlns:m="http://schemas.openxmlformats.org/officeDocument/2006/math">
-                    <m:sSub>
-                      <m:sSubPr>
-                        <m:ctrlPr>
-                          <a:rPr lang="en-US" i="1">
-                            <a:latin typeface="Cambria Math" panose="02040503050406030204" pitchFamily="18" charset="0"/>
-                          </a:rPr>
-                        </m:ctrlPr>
-                      </m:sSubPr>
-                      <m:e>
-                        <m:r>
-                          <a:rPr lang="en-US" i="1">
-                            <a:latin typeface="Cambria Math" panose="02040503050406030204" pitchFamily="18" charset="0"/>
-                          </a:rPr>
-                          <m:t>𝑦</m:t>
-                        </m:r>
-                      </m:e>
-                      <m:sub>
-                        <m:r>
-                          <a:rPr lang="en-US" i="1">
-                            <a:latin typeface="Cambria Math" panose="02040503050406030204" pitchFamily="18" charset="0"/>
-                          </a:rPr>
-                          <m:t>𝑖</m:t>
-                        </m:r>
-                        <m:r>
-                          <a:rPr lang="en-US" i="1">
-                            <a:latin typeface="Cambria Math" panose="02040503050406030204" pitchFamily="18" charset="0"/>
-                          </a:rPr>
-                          <m:t>,</m:t>
-                        </m:r>
-                        <m:sSub>
-                          <m:sSubPr>
-                            <m:ctrlPr>
-                              <a:rPr lang="en-US" i="1">
-                                <a:latin typeface="Cambria Math" panose="02040503050406030204" pitchFamily="18" charset="0"/>
-                              </a:rPr>
-                            </m:ctrlPr>
-                          </m:sSubPr>
-                          <m:e>
-                            <m:r>
-                              <a:rPr lang="en-US" i="1">
-                                <a:latin typeface="Cambria Math" panose="02040503050406030204" pitchFamily="18" charset="0"/>
-                              </a:rPr>
-                              <m:t>𝑘</m:t>
-                            </m:r>
-                          </m:e>
-                          <m:sub>
-                            <m:r>
-                              <a:rPr lang="en-US" i="1">
-                                <a:latin typeface="Cambria Math" panose="02040503050406030204" pitchFamily="18" charset="0"/>
-                              </a:rPr>
-                              <m:t>𝑖</m:t>
-                            </m:r>
-                          </m:sub>
-                        </m:sSub>
-                        <m:r>
-                          <a:rPr lang="en-US" i="1">
-                            <a:latin typeface="Cambria Math" panose="02040503050406030204" pitchFamily="18" charset="0"/>
-                          </a:rPr>
-                          <m:t>,</m:t>
-                        </m:r>
-                        <m:r>
-                          <a:rPr lang="en-US" i="1">
-                            <a:latin typeface="Cambria Math" panose="02040503050406030204" pitchFamily="18" charset="0"/>
-                          </a:rPr>
-                          <m:t>𝑗</m:t>
-                        </m:r>
-                        <m:r>
-                          <a:rPr lang="en-US" i="1">
-                            <a:latin typeface="Cambria Math" panose="02040503050406030204" pitchFamily="18" charset="0"/>
-                          </a:rPr>
-                          <m:t>, </m:t>
-                        </m:r>
-                        <m:sSub>
-                          <m:sSubPr>
-                            <m:ctrlPr>
-                              <a:rPr lang="en-US" i="1">
-                                <a:latin typeface="Cambria Math" panose="02040503050406030204" pitchFamily="18" charset="0"/>
-                              </a:rPr>
-                            </m:ctrlPr>
-                          </m:sSubPr>
-                          <m:e>
-                            <m:r>
-                              <a:rPr lang="en-US" i="1">
-                                <a:latin typeface="Cambria Math" panose="02040503050406030204" pitchFamily="18" charset="0"/>
-                              </a:rPr>
-                              <m:t>𝑘</m:t>
-                            </m:r>
-                          </m:e>
-                          <m:sub>
-                            <m:r>
-                              <a:rPr lang="en-US" i="1">
-                                <a:latin typeface="Cambria Math" panose="02040503050406030204" pitchFamily="18" charset="0"/>
-                              </a:rPr>
-                              <m:t>𝑗</m:t>
-                            </m:r>
-                          </m:sub>
-                        </m:sSub>
-                      </m:sub>
-                    </m:sSub>
-                    <m:r>
-                      <a:rPr lang="en-US" b="0" i="0" smtClean="0">
-                        <a:latin typeface="Cambria Math" panose="02040503050406030204" pitchFamily="18" charset="0"/>
-                      </a:rPr>
-                      <m:t>,</m:t>
-                    </m:r>
-                    <m:r>
-                      <m:rPr>
-                        <m:nor/>
-                      </m:rPr>
-                      <a:rPr lang="en-US" dirty="0"/>
-                      <m:t> </m:t>
-                    </m:r>
-                    <m:sSub>
-                      <m:sSubPr>
-                        <m:ctrlPr>
-                          <a:rPr lang="en-US" i="1">
-                            <a:latin typeface="Cambria Math" panose="02040503050406030204" pitchFamily="18" charset="0"/>
-                          </a:rPr>
-                        </m:ctrlPr>
-                      </m:sSubPr>
-                      <m:e>
-                        <m:r>
                           <a:rPr lang="en-US" i="1">
                             <a:latin typeface="Cambria Math" panose="02040503050406030204" pitchFamily="18" charset="0"/>
                           </a:rPr>
@@ -32107,7 +31831,7 @@
             </p:txBody>
           </p:sp>
         </mc:Choice>
-        <mc:Fallback xmlns="">
+        <mc:Fallback>
           <p:sp>
             <p:nvSpPr>
               <p:cNvPr id="4" name="Content Placeholder 3">

</xml_diff>